<commit_message>
* Result<None> support * Result<T>.RefineError
</commit_message>
<xml_diff>
--- a/fp2.pptx
+++ b/fp2.pptx
@@ -5,7 +5,7 @@
     <p:sldMasterId id="2147483660" r:id="rId1"/>
   </p:sldMasterIdLst>
   <p:notesMasterIdLst>
-    <p:notesMasterId r:id="rId30"/>
+    <p:notesMasterId r:id="rId31"/>
   </p:notesMasterIdLst>
   <p:sldIdLst>
     <p:sldId id="256" r:id="rId2"/>
@@ -34,8 +34,9 @@
     <p:sldId id="367" r:id="rId25"/>
     <p:sldId id="365" r:id="rId26"/>
     <p:sldId id="368" r:id="rId27"/>
-    <p:sldId id="380" r:id="rId28"/>
-    <p:sldId id="381" r:id="rId29"/>
+    <p:sldId id="385" r:id="rId28"/>
+    <p:sldId id="380" r:id="rId29"/>
+    <p:sldId id="381" r:id="rId30"/>
   </p:sldIdLst>
   <p:sldSz cx="9144000" cy="6858000" type="screen4x3"/>
   <p:notesSz cx="6858000" cy="9144000"/>
@@ -224,7 +225,7 @@
           <a:p>
             <a:fld id="{0E711FAB-AA64-4E6E-B985-A733977625EE}" type="datetimeFigureOut">
               <a:rPr lang="ru-RU" smtClean="0"/>
-              <a:t>18.11.2016</a:t>
+              <a:t>11.12.2016</a:t>
             </a:fld>
             <a:endParaRPr lang="ru-RU"/>
           </a:p>
@@ -946,7 +947,7 @@
           <a:p>
             <a:fld id="{DCDCBEE7-9590-4FF6-ADDF-3D4B876C8442}" type="datetimeFigureOut">
               <a:rPr lang="ru-RU" smtClean="0"/>
-              <a:t>18.11.2016</a:t>
+              <a:t>11.12.2016</a:t>
             </a:fld>
             <a:endParaRPr lang="ru-RU"/>
           </a:p>
@@ -1147,7 +1148,7 @@
           <a:p>
             <a:fld id="{DCDCBEE7-9590-4FF6-ADDF-3D4B876C8442}" type="datetimeFigureOut">
               <a:rPr lang="ru-RU" smtClean="0"/>
-              <a:t>18.11.2016</a:t>
+              <a:t>11.12.2016</a:t>
             </a:fld>
             <a:endParaRPr lang="ru-RU"/>
           </a:p>
@@ -1351,7 +1352,7 @@
           <a:p>
             <a:fld id="{DCDCBEE7-9590-4FF6-ADDF-3D4B876C8442}" type="datetimeFigureOut">
               <a:rPr lang="ru-RU" smtClean="0"/>
-              <a:t>18.11.2016</a:t>
+              <a:t>11.12.2016</a:t>
             </a:fld>
             <a:endParaRPr lang="ru-RU"/>
           </a:p>
@@ -1545,7 +1546,7 @@
           <a:p>
             <a:fld id="{DCDCBEE7-9590-4FF6-ADDF-3D4B876C8442}" type="datetimeFigureOut">
               <a:rPr lang="ru-RU" smtClean="0"/>
-              <a:t>18.11.2016</a:t>
+              <a:t>11.12.2016</a:t>
             </a:fld>
             <a:endParaRPr lang="ru-RU"/>
           </a:p>
@@ -1820,7 +1821,7 @@
           <a:p>
             <a:fld id="{DCDCBEE7-9590-4FF6-ADDF-3D4B876C8442}" type="datetimeFigureOut">
               <a:rPr lang="ru-RU" smtClean="0"/>
-              <a:t>18.11.2016</a:t>
+              <a:t>11.12.2016</a:t>
             </a:fld>
             <a:endParaRPr lang="ru-RU"/>
           </a:p>
@@ -2076,7 +2077,7 @@
           <a:p>
             <a:fld id="{DCDCBEE7-9590-4FF6-ADDF-3D4B876C8442}" type="datetimeFigureOut">
               <a:rPr lang="ru-RU" smtClean="0"/>
-              <a:t>18.11.2016</a:t>
+              <a:t>11.12.2016</a:t>
             </a:fld>
             <a:endParaRPr lang="ru-RU"/>
           </a:p>
@@ -2467,7 +2468,7 @@
           <a:p>
             <a:fld id="{DCDCBEE7-9590-4FF6-ADDF-3D4B876C8442}" type="datetimeFigureOut">
               <a:rPr lang="ru-RU" smtClean="0"/>
-              <a:t>18.11.2016</a:t>
+              <a:t>11.12.2016</a:t>
             </a:fld>
             <a:endParaRPr lang="ru-RU"/>
           </a:p>
@@ -2609,7 +2610,7 @@
           <a:p>
             <a:fld id="{DCDCBEE7-9590-4FF6-ADDF-3D4B876C8442}" type="datetimeFigureOut">
               <a:rPr lang="ru-RU" smtClean="0"/>
-              <a:t>18.11.2016</a:t>
+              <a:t>11.12.2016</a:t>
             </a:fld>
             <a:endParaRPr lang="ru-RU"/>
           </a:p>
@@ -2728,7 +2729,7 @@
           <a:p>
             <a:fld id="{DCDCBEE7-9590-4FF6-ADDF-3D4B876C8442}" type="datetimeFigureOut">
               <a:rPr lang="ru-RU" smtClean="0"/>
-              <a:t>18.11.2016</a:t>
+              <a:t>11.12.2016</a:t>
             </a:fld>
             <a:endParaRPr lang="ru-RU"/>
           </a:p>
@@ -3029,7 +3030,7 @@
           <a:p>
             <a:fld id="{DCDCBEE7-9590-4FF6-ADDF-3D4B876C8442}" type="datetimeFigureOut">
               <a:rPr lang="ru-RU" smtClean="0"/>
-              <a:t>18.11.2016</a:t>
+              <a:t>11.12.2016</a:t>
             </a:fld>
             <a:endParaRPr lang="ru-RU"/>
           </a:p>
@@ -3310,7 +3311,7 @@
           <a:p>
             <a:fld id="{DCDCBEE7-9590-4FF6-ADDF-3D4B876C8442}" type="datetimeFigureOut">
               <a:rPr lang="ru-RU" smtClean="0"/>
-              <a:t>18.11.2016</a:t>
+              <a:t>11.12.2016</a:t>
             </a:fld>
             <a:endParaRPr lang="ru-RU"/>
           </a:p>
@@ -6231,9 +6232,6 @@
               </a:rPr>
               <a:t>()	</a:t>
             </a:r>
-            <a:endParaRPr lang="en-US" dirty="0" smtClean="0">
-              <a:latin typeface="Consolas" panose="020B0609020204030204" pitchFamily="49" charset="0"/>
-            </a:endParaRPr>
           </a:p>
           <a:p>
             <a:pPr marL="0" indent="0">
@@ -6586,59 +6584,29 @@
               <a:rPr lang="en-US" sz="2400" dirty="0" smtClean="0">
                 <a:latin typeface="Consolas" panose="020B0609020204030204" pitchFamily="49" charset="0"/>
               </a:rPr>
-              <a:t>  </a:t>
-            </a:r>
+              <a:t>  .Then(content =&gt; Parse(content))</a:t>
+            </a:r>
+          </a:p>
+          <a:p>
+            <a:pPr marL="0" indent="0">
+              <a:buNone/>
+            </a:pPr>
             <a:r>
               <a:rPr lang="en-US" sz="2400" dirty="0" smtClean="0">
                 <a:latin typeface="Consolas" panose="020B0609020204030204" pitchFamily="49" charset="0"/>
               </a:rPr>
-              <a:t>.Then(content </a:t>
-            </a:r>
+              <a:t>  .Then(doc =&gt; Convert(doc))</a:t>
+            </a:r>
+          </a:p>
+          <a:p>
+            <a:pPr marL="0" indent="0">
+              <a:buNone/>
+            </a:pPr>
             <a:r>
               <a:rPr lang="en-US" sz="2400" dirty="0" smtClean="0">
                 <a:latin typeface="Consolas" panose="020B0609020204030204" pitchFamily="49" charset="0"/>
               </a:rPr>
-              <a:t>=&gt; Parse(content))</a:t>
-            </a:r>
-          </a:p>
-          <a:p>
-            <a:pPr marL="0" indent="0">
-              <a:buNone/>
-            </a:pPr>
-            <a:r>
-              <a:rPr lang="en-US" sz="2400" dirty="0" smtClean="0">
-                <a:latin typeface="Consolas" panose="020B0609020204030204" pitchFamily="49" charset="0"/>
-              </a:rPr>
-              <a:t>  </a:t>
-            </a:r>
-            <a:r>
-              <a:rPr lang="en-US" sz="2400" dirty="0" smtClean="0">
-                <a:latin typeface="Consolas" panose="020B0609020204030204" pitchFamily="49" charset="0"/>
-              </a:rPr>
-              <a:t>.Then(doc </a:t>
-            </a:r>
-            <a:r>
-              <a:rPr lang="en-US" sz="2400" dirty="0" smtClean="0">
-                <a:latin typeface="Consolas" panose="020B0609020204030204" pitchFamily="49" charset="0"/>
-              </a:rPr>
-              <a:t>=&gt; Convert(doc))</a:t>
-            </a:r>
-          </a:p>
-          <a:p>
-            <a:pPr marL="0" indent="0">
-              <a:buNone/>
-            </a:pPr>
-            <a:r>
-              <a:rPr lang="en-US" sz="2400" dirty="0" smtClean="0">
-                <a:latin typeface="Consolas" panose="020B0609020204030204" pitchFamily="49" charset="0"/>
-              </a:rPr>
-              <a:t>  .Then(docV2 </a:t>
-            </a:r>
-            <a:r>
-              <a:rPr lang="en-US" sz="2400" dirty="0" smtClean="0">
-                <a:latin typeface="Consolas" panose="020B0609020204030204" pitchFamily="49" charset="0"/>
-              </a:rPr>
-              <a:t>=&gt; Save(filename, docV2))</a:t>
+              <a:t>  .Then(docV2 =&gt; Save(filename, docV2))</a:t>
             </a:r>
           </a:p>
           <a:p>
@@ -7195,11 +7163,11 @@
   <p:clrMapOvr>
     <a:masterClrMapping/>
   </p:clrMapOvr>
-  <mc:AlternateContent xmlns:mc="http://schemas.openxmlformats.org/markup-compatibility/2006" xmlns:p14="http://schemas.microsoft.com/office/powerpoint/2010/main">
-    <mc:Choice Requires="p14">
+  <mc:AlternateContent xmlns:mc="http://schemas.openxmlformats.org/markup-compatibility/2006">
+    <mc:Choice xmlns:p14="http://schemas.microsoft.com/office/powerpoint/2010/main" Requires="p14">
       <p:transition spd="slow" p14:dur="2000"/>
     </mc:Choice>
-    <mc:Fallback xmlns="">
+    <mc:Fallback>
       <p:transition spd="slow"/>
     </mc:Fallback>
   </mc:AlternateContent>
@@ -7246,6 +7214,85 @@
           <a:lstStyle/>
           <a:p>
             <a:r>
+              <a:rPr lang="en-US" dirty="0" err="1" smtClean="0"/>
+              <a:t>ApprovalsDemo</a:t>
+            </a:r>
+            <a:endParaRPr lang="ru-RU" dirty="0"/>
+          </a:p>
+        </p:txBody>
+      </p:sp>
+      <p:sp>
+        <p:nvSpPr>
+          <p:cNvPr id="3" name="Объект 2"/>
+          <p:cNvSpPr>
+            <a:spLocks noGrp="1"/>
+          </p:cNvSpPr>
+          <p:nvPr>
+            <p:ph idx="1"/>
+          </p:nvPr>
+        </p:nvSpPr>
+        <p:spPr/>
+        <p:txBody>
+          <a:bodyPr/>
+          <a:lstStyle/>
+          <a:p>
+            <a:endParaRPr lang="ru-RU"/>
+          </a:p>
+        </p:txBody>
+      </p:sp>
+    </p:spTree>
+    <p:extLst>
+      <p:ext uri="{BB962C8B-B14F-4D97-AF65-F5344CB8AC3E}">
+        <p14:creationId xmlns:p14="http://schemas.microsoft.com/office/powerpoint/2010/main" val="4249290212"/>
+      </p:ext>
+    </p:extLst>
+  </p:cSld>
+  <p:clrMapOvr>
+    <a:masterClrMapping/>
+  </p:clrMapOvr>
+  <p:timing>
+    <p:tnLst>
+      <p:par>
+        <p:cTn id="1" dur="indefinite" restart="never" nodeType="tmRoot"/>
+      </p:par>
+    </p:tnLst>
+  </p:timing>
+</p:sld>
+</file>
+
+<file path=ppt/slides/slide28.xml><?xml version="1.0" encoding="utf-8"?>
+<p:sld xmlns:a="http://schemas.openxmlformats.org/drawingml/2006/main" xmlns:r="http://schemas.openxmlformats.org/officeDocument/2006/relationships" xmlns:p="http://schemas.openxmlformats.org/presentationml/2006/main">
+  <p:cSld>
+    <p:spTree>
+      <p:nvGrpSpPr>
+        <p:cNvPr id="1" name=""/>
+        <p:cNvGrpSpPr/>
+        <p:nvPr/>
+      </p:nvGrpSpPr>
+      <p:grpSpPr>
+        <a:xfrm>
+          <a:off x="0" y="0"/>
+          <a:ext cx="0" cy="0"/>
+          <a:chOff x="0" y="0"/>
+          <a:chExt cx="0" cy="0"/>
+        </a:xfrm>
+      </p:grpSpPr>
+      <p:sp>
+        <p:nvSpPr>
+          <p:cNvPr id="2" name="Заголовок 1"/>
+          <p:cNvSpPr>
+            <a:spLocks noGrp="1"/>
+          </p:cNvSpPr>
+          <p:nvPr>
+            <p:ph type="title"/>
+          </p:nvPr>
+        </p:nvSpPr>
+        <p:spPr/>
+        <p:txBody>
+          <a:bodyPr/>
+          <a:lstStyle/>
+          <a:p>
+            <a:r>
               <a:rPr lang="ru-RU" dirty="0" smtClean="0"/>
               <a:t>Задача </a:t>
             </a:r>
@@ -7274,8 +7321,28 @@
           </a:xfrm>
         </p:spPr>
         <p:txBody>
-          <a:bodyPr/>
+          <a:bodyPr>
+            <a:normAutofit/>
+          </a:bodyPr>
           <a:lstStyle/>
+          <a:p>
+            <a:pPr marL="514350" indent="-514350">
+              <a:buFont typeface="Arial" panose="020B0604020202020204" pitchFamily="34" charset="0"/>
+              <a:buAutoNum type="arabicPeriod"/>
+            </a:pPr>
+            <a:r>
+              <a:rPr lang="en-US" dirty="0"/>
+              <a:t>Document</a:t>
+            </a:r>
+            <a:r>
+              <a:rPr lang="ru-RU" dirty="0"/>
+              <a:t> → </a:t>
+            </a:r>
+            <a:r>
+              <a:rPr lang="en-US" dirty="0"/>
+              <a:t>Immutable</a:t>
+            </a:r>
+          </a:p>
           <a:p>
             <a:pPr marL="514350" indent="-514350">
               <a:buAutoNum type="arabicPeriod"/>
@@ -7285,11 +7352,11 @@
               <a:t>Отделить чистую функцию </a:t>
             </a:r>
             <a:r>
-              <a:rPr lang="en-US" dirty="0" err="1"/>
+              <a:rPr lang="en-US" dirty="0" err="1" smtClean="0"/>
               <a:t>PrepareFileToSend</a:t>
             </a:r>
             <a:r>
-              <a:rPr lang="en-US" dirty="0"/>
+              <a:rPr lang="en-US" dirty="0" smtClean="0"/>
               <a:t> </a:t>
             </a:r>
             <a:r>
@@ -7318,14 +7385,52 @@
               <a:buAutoNum type="arabicPeriod"/>
             </a:pPr>
             <a:r>
+              <a:rPr lang="ru-RU" dirty="0"/>
+              <a:t>Добавить </a:t>
+            </a:r>
+            <a:r>
+              <a:rPr lang="ru-RU" dirty="0" err="1"/>
+              <a:t>доп</a:t>
+            </a:r>
+            <a:r>
+              <a:rPr lang="ru-RU" dirty="0"/>
+              <a:t>-инфу в ошибках</a:t>
+            </a:r>
+          </a:p>
+          <a:p>
+            <a:pPr marL="971550" lvl="1" indent="-514350">
+              <a:buAutoNum type="arabicPeriod"/>
+            </a:pPr>
+            <a:r>
               <a:rPr lang="ru-RU" dirty="0" smtClean="0"/>
-              <a:t>Тесты на </a:t>
-            </a:r>
-            <a:r>
-              <a:rPr lang="en-US" dirty="0" err="1" smtClean="0"/>
-              <a:t>PrepareFileToSend</a:t>
-            </a:r>
-            <a:endParaRPr lang="en-US" dirty="0" smtClean="0"/>
+              <a:t>Верси</a:t>
+            </a:r>
+            <a:r>
+              <a:rPr lang="ru-RU" dirty="0"/>
+              <a:t>ю</a:t>
+            </a:r>
+            <a:r>
+              <a:rPr lang="ru-RU" dirty="0" smtClean="0"/>
+              <a:t> </a:t>
+            </a:r>
+            <a:r>
+              <a:rPr lang="ru-RU" dirty="0"/>
+              <a:t>формата, если он не поддерживается</a:t>
+            </a:r>
+          </a:p>
+          <a:p>
+            <a:pPr marL="971550" lvl="1" indent="-514350">
+              <a:buAutoNum type="arabicPeriod"/>
+            </a:pPr>
+            <a:r>
+              <a:rPr lang="ru-RU" dirty="0" smtClean="0"/>
+              <a:t>Дату создания, </a:t>
+            </a:r>
+            <a:r>
+              <a:rPr lang="ru-RU" dirty="0"/>
+              <a:t>если документ слишком старый</a:t>
+            </a:r>
+            <a:endParaRPr lang="en-US" dirty="0"/>
           </a:p>
           <a:p>
             <a:pPr marL="514350" indent="-514350">
@@ -7333,30 +7438,58 @@
             </a:pPr>
             <a:r>
               <a:rPr lang="ru-RU" dirty="0" smtClean="0"/>
-              <a:t>Логику на исключениях → </a:t>
+              <a:t>Логику </a:t>
+            </a:r>
+            <a:r>
+              <a:rPr lang="ru-RU" dirty="0" smtClean="0"/>
+              <a:t>на исключениях → </a:t>
             </a:r>
             <a:r>
               <a:rPr lang="en-US" dirty="0" smtClean="0"/>
               <a:t>Result&lt;T&gt;</a:t>
             </a:r>
+            <a:r>
+              <a:rPr lang="ru-RU" dirty="0" smtClean="0"/>
+              <a:t/>
+            </a:r>
+            <a:br>
+              <a:rPr lang="ru-RU" dirty="0" smtClean="0"/>
+            </a:br>
+            <a:r>
+              <a:rPr lang="en-US" dirty="0" err="1" smtClean="0"/>
+              <a:t>PrepareFileToSend</a:t>
+            </a:r>
+            <a:r>
+              <a:rPr lang="ru-RU" dirty="0" smtClean="0"/>
+              <a:t> </a:t>
+            </a:r>
+            <a:r>
+              <a:rPr lang="ru-RU" dirty="0"/>
+              <a:t>переписать декларативно</a:t>
+            </a:r>
           </a:p>
           <a:p>
             <a:pPr marL="514350" indent="-514350">
+              <a:buFont typeface="Arial" panose="020B0604020202020204" pitchFamily="34" charset="0"/>
               <a:buAutoNum type="arabicPeriod"/>
             </a:pPr>
             <a:r>
-              <a:rPr lang="en-US" dirty="0" err="1" smtClean="0"/>
+              <a:rPr lang="ru-RU" dirty="0" smtClean="0"/>
+              <a:t>Переделать </a:t>
+            </a:r>
+            <a:r>
+              <a:rPr lang="ru-RU" dirty="0"/>
+              <a:t>тесты на </a:t>
+            </a:r>
+            <a:r>
+              <a:rPr lang="en-US" dirty="0" err="1"/>
               <a:t>PrepareFileToSend</a:t>
             </a:r>
-            <a:r>
-              <a:rPr lang="ru-RU" dirty="0" smtClean="0"/>
-              <a:t> → декларативно</a:t>
-            </a:r>
-            <a:endParaRPr lang="en-US" dirty="0" smtClean="0"/>
-          </a:p>
-          <a:p>
-            <a:pPr marL="514350" indent="-514350">
-              <a:buAutoNum type="arabicPeriod"/>
+            <a:endParaRPr lang="ru-RU" dirty="0"/>
+          </a:p>
+          <a:p>
+            <a:pPr marL="0" indent="0">
+              <a:buNone/>
             </a:pPr>
             <a:endParaRPr lang="en-US" dirty="0"/>
           </a:p>
@@ -7392,7 +7525,7 @@
 </p:sld>
 </file>
 
-<file path=ppt/slides/slide28.xml><?xml version="1.0" encoding="utf-8"?>
+<file path=ppt/slides/slide29.xml><?xml version="1.0" encoding="utf-8"?>
 <p:sld xmlns:a="http://schemas.openxmlformats.org/drawingml/2006/main" xmlns:r="http://schemas.openxmlformats.org/officeDocument/2006/relationships" xmlns:p="http://schemas.openxmlformats.org/presentationml/2006/main">
   <p:cSld>
     <p:spTree>

</xml_diff>